<commit_message>
Added 06. ExpressJS homework
</commit_message>
<xml_diff>
--- a/06. ExpressJS/ExpressJS.pptx
+++ b/06. ExpressJS/ExpressJS.pptx
@@ -5,7 +5,7 @@
     <p:sldMasterId id="2147483660" r:id="rId1"/>
   </p:sldMasterIdLst>
   <p:notesMasterIdLst>
-    <p:notesMasterId r:id="rId23"/>
+    <p:notesMasterId r:id="rId22"/>
   </p:notesMasterIdLst>
   <p:sldIdLst>
     <p:sldId id="256" r:id="rId2"/>
@@ -28,7 +28,6 @@
     <p:sldId id="298" r:id="rId19"/>
     <p:sldId id="299" r:id="rId20"/>
     <p:sldId id="288" r:id="rId21"/>
-    <p:sldId id="312" r:id="rId22"/>
   </p:sldIdLst>
   <p:sldSz cx="9144000" cy="6858000" type="screen4x3"/>
   <p:notesSz cx="6858000" cy="9144000"/>
@@ -176,13 +175,23 @@
         <p14:section name="Questions" id="{FFCA31E4-3E11-4F1E-9395-685EE6DD6447}">
           <p14:sldIdLst>
             <p14:sldId id="288"/>
-            <p14:sldId id="312"/>
           </p14:sldIdLst>
         </p14:section>
       </p14:sectionLst>
     </p:ext>
     <p:ext uri="{EFAFB233-063F-42B5-8137-9DF3F51BA10A}">
-      <p15:sldGuideLst xmlns:p15="http://schemas.microsoft.com/office/powerpoint/2012/main" xmlns=""/>
+      <p15:sldGuideLst xmlns:p15="http://schemas.microsoft.com/office/powerpoint/2012/main">
+        <p15:guide id="1" orient="horz" pos="2160">
+          <p15:clr>
+            <a:srgbClr val="A4A3A4"/>
+          </p15:clr>
+        </p15:guide>
+        <p15:guide id="2" pos="2880">
+          <p15:clr>
+            <a:srgbClr val="A4A3A4"/>
+          </p15:clr>
+        </p15:guide>
+      </p15:sldGuideLst>
     </p:ext>
   </p:extLst>
 </p:presentation>
@@ -270,7 +279,7 @@
           <a:p>
             <a:fld id="{464D2B2C-C7F1-41AD-AFF3-6EECE3377837}" type="datetimeFigureOut">
               <a:rPr lang="en-US" smtClean="0"/>
-              <a:t>10/3/2014</a:t>
+              <a:t>1/3/2016</a:t>
             </a:fld>
             <a:endParaRPr lang="en-US"/>
           </a:p>
@@ -10327,184 +10336,6 @@
       </p:par>
     </p:tnLst>
   </p:timing>
-</p:sld>
-</file>
-
-<file path=ppt/slides/slide21.xml><?xml version="1.0" encoding="utf-8"?>
-<p:sld xmlns:a="http://schemas.openxmlformats.org/drawingml/2006/main" xmlns:r="http://schemas.openxmlformats.org/officeDocument/2006/relationships" xmlns:p="http://schemas.openxmlformats.org/presentationml/2006/main">
-  <p:cSld>
-    <p:spTree>
-      <p:nvGrpSpPr>
-        <p:cNvPr id="1" name=""/>
-        <p:cNvGrpSpPr/>
-        <p:nvPr/>
-      </p:nvGrpSpPr>
-      <p:grpSpPr>
-        <a:xfrm>
-          <a:off x="0" y="0"/>
-          <a:ext cx="0" cy="0"/>
-          <a:chOff x="0" y="0"/>
-          <a:chExt cx="0" cy="0"/>
-        </a:xfrm>
-      </p:grpSpPr>
-      <p:sp>
-        <p:nvSpPr>
-          <p:cNvPr id="6" name="Title 5"/>
-          <p:cNvSpPr>
-            <a:spLocks noGrp="1"/>
-          </p:cNvSpPr>
-          <p:nvPr>
-            <p:ph type="title"/>
-          </p:nvPr>
-        </p:nvSpPr>
-        <p:spPr/>
-        <p:txBody>
-          <a:bodyPr/>
-          <a:lstStyle/>
-          <a:p>
-            <a:r>
-              <a:rPr lang="en-US" dirty="0" smtClean="0"/>
-              <a:t>Homework</a:t>
-            </a:r>
-            <a:endParaRPr lang="en-US" dirty="0"/>
-          </a:p>
-        </p:txBody>
-      </p:sp>
-      <p:sp>
-        <p:nvSpPr>
-          <p:cNvPr id="7" name="Content Placeholder 6"/>
-          <p:cNvSpPr>
-            <a:spLocks noGrp="1"/>
-          </p:cNvSpPr>
-          <p:nvPr>
-            <p:ph idx="1"/>
-          </p:nvPr>
-        </p:nvSpPr>
-        <p:spPr>
-          <a:xfrm>
-            <a:off x="228600" y="852254"/>
-            <a:ext cx="8686800" cy="5791200"/>
-          </a:xfrm>
-        </p:spPr>
-        <p:txBody>
-          <a:bodyPr/>
-          <a:lstStyle/>
-          <a:p>
-            <a:pPr marL="284163" indent="-284163">
-              <a:lnSpc>
-                <a:spcPct val="90000"/>
-              </a:lnSpc>
-              <a:buFont typeface="+mj-lt"/>
-              <a:buAutoNum type="arabicPeriod"/>
-            </a:pPr>
-            <a:r>
-              <a:rPr lang="en-US" sz="2800" dirty="0" smtClean="0"/>
-              <a:t>Create a web site (with normal design) using Express with private and public parts – CRUD operations over </a:t>
-            </a:r>
-            <a:r>
-              <a:rPr lang="en-US" sz="2800" dirty="0"/>
-              <a:t>a model by your choice </a:t>
-            </a:r>
-            <a:endParaRPr lang="en-US" sz="2800" dirty="0" smtClean="0"/>
-          </a:p>
-          <a:p>
-            <a:pPr marL="804863" lvl="1" indent="-457200">
-              <a:lnSpc>
-                <a:spcPct val="90000"/>
-              </a:lnSpc>
-            </a:pPr>
-            <a:r>
-              <a:rPr lang="en-US" dirty="0" smtClean="0"/>
-              <a:t>At least 6 pages</a:t>
-            </a:r>
-          </a:p>
-          <a:p>
-            <a:pPr marL="804863" lvl="1" indent="-457200">
-              <a:lnSpc>
-                <a:spcPct val="90000"/>
-              </a:lnSpc>
-            </a:pPr>
-            <a:r>
-              <a:rPr lang="en-US" dirty="0" smtClean="0"/>
-              <a:t>Use Express</a:t>
-            </a:r>
-          </a:p>
-          <a:p>
-            <a:pPr marL="804863" lvl="1" indent="-457200">
-              <a:lnSpc>
-                <a:spcPct val="90000"/>
-              </a:lnSpc>
-            </a:pPr>
-            <a:r>
-              <a:rPr lang="en-US" dirty="0" smtClean="0"/>
-              <a:t>Use File upload</a:t>
-            </a:r>
-          </a:p>
-          <a:p>
-            <a:pPr marL="804863" lvl="1" indent="-457200">
-              <a:lnSpc>
-                <a:spcPct val="90000"/>
-              </a:lnSpc>
-            </a:pPr>
-            <a:r>
-              <a:rPr lang="en-US" dirty="0" smtClean="0"/>
-              <a:t>Use Jade</a:t>
-            </a:r>
-          </a:p>
-          <a:p>
-            <a:pPr marL="804863" lvl="1" indent="-457200">
-              <a:lnSpc>
-                <a:spcPct val="90000"/>
-              </a:lnSpc>
-            </a:pPr>
-            <a:r>
-              <a:rPr lang="en-US" dirty="0" smtClean="0"/>
-              <a:t>Use Stylus</a:t>
-            </a:r>
-          </a:p>
-          <a:p>
-            <a:pPr marL="804863" lvl="1" indent="-457200">
-              <a:lnSpc>
-                <a:spcPct val="90000"/>
-              </a:lnSpc>
-            </a:pPr>
-            <a:r>
-              <a:rPr lang="en-US" dirty="0" smtClean="0"/>
-              <a:t>Use Passport module for authentication</a:t>
-            </a:r>
-          </a:p>
-          <a:p>
-            <a:pPr marL="804863" lvl="1" indent="-457200">
-              <a:lnSpc>
-                <a:spcPct val="90000"/>
-              </a:lnSpc>
-            </a:pPr>
-            <a:r>
-              <a:rPr lang="en-US" dirty="0" smtClean="0"/>
-              <a:t>Use good application architecture</a:t>
-            </a:r>
-            <a:endParaRPr lang="en-US" dirty="0" smtClean="0"/>
-          </a:p>
-          <a:p>
-            <a:pPr marL="804863" lvl="1" indent="-457200">
-              <a:lnSpc>
-                <a:spcPct val="90000"/>
-              </a:lnSpc>
-            </a:pPr>
-            <a:endParaRPr lang="en-US" dirty="0"/>
-          </a:p>
-        </p:txBody>
-      </p:sp>
-    </p:spTree>
-    <p:extLst>
-      <p:ext uri="{BB962C8B-B14F-4D97-AF65-F5344CB8AC3E}">
-        <p14:creationId xmlns:p14="http://schemas.microsoft.com/office/powerpoint/2010/main" val="1850309860"/>
-      </p:ext>
-    </p:extLst>
-  </p:cSld>
-  <p:clrMapOvr>
-    <a:masterClrMapping/>
-  </p:clrMapOvr>
 </p:sld>
 </file>
 
@@ -14766,7 +14597,7 @@
   <a:extraClrSchemeLst/>
   <a:extLst>
     <a:ext uri="{05A4C25C-085E-4340-85A3-A5531E510DB2}">
-      <thm15:themeFamily xmlns:thm15="http://schemas.microsoft.com/office/thememl/2012/main" xmlns="" name="Telerik Academy theme" id="{2620D71C-A5FD-46E0-A488-16D4CF22AEE2}" vid="{F028A4D3-6851-4D6D-A82D-72CBFB9A818D}"/>
+      <thm15:themeFamily xmlns:thm15="http://schemas.microsoft.com/office/thememl/2012/main" name="Telerik Academy theme" id="{2620D71C-A5FD-46E0-A488-16D4CF22AEE2}" vid="{F028A4D3-6851-4D6D-A82D-72CBFB9A818D}"/>
     </a:ext>
   </a:extLst>
 </a:theme>
@@ -15027,7 +14858,7 @@
   <a:extraClrSchemeLst/>
   <a:extLst>
     <a:ext uri="{05A4C25C-085E-4340-85A3-A5531E510DB2}">
-      <thm15:themeFamily xmlns:thm15="http://schemas.microsoft.com/office/thememl/2012/main" xmlns="" name="Office Theme" id="{62F939B6-93AF-4DB8-9C6B-D6C7DFDC589F}" vid="{4A3C46E8-61CC-4603-A589-7422A47A8E4A}"/>
+      <thm15:themeFamily xmlns:thm15="http://schemas.microsoft.com/office/thememl/2012/main" name="Office Theme" id="{62F939B6-93AF-4DB8-9C6B-D6C7DFDC589F}" vid="{4A3C46E8-61CC-4603-A589-7422A47A8E4A}"/>
     </a:ext>
   </a:extLst>
 </a:theme>

</xml_diff>